<commit_message>
documentation + ppt + jdt
</commit_message>
<xml_diff>
--- a/Dev/Présentation.pptx
+++ b/Dev/Présentation.pptx
@@ -202,7 +202,7 @@
           <a:p>
             <a:fld id="{424A98EB-6ADD-4D71-B2D7-56CE150BD037}" type="datetimeFigureOut">
               <a:rPr lang="fr-CH" smtClean="0"/>
-              <a:t>03.04.2019</a:t>
+              <a:t>04.04.2019</a:t>
             </a:fld>
             <a:endParaRPr lang="fr-CH"/>
           </a:p>
@@ -964,7 +964,7 @@
           <a:p>
             <a:fld id="{25A13FF3-A3B4-402D-91B1-C176C247EB92}" type="datetimeFigureOut">
               <a:rPr lang="fr-CH" smtClean="0"/>
-              <a:t>03.04.2019</a:t>
+              <a:t>04.04.2019</a:t>
             </a:fld>
             <a:endParaRPr lang="fr-CH"/>
           </a:p>
@@ -1134,7 +1134,7 @@
           <a:p>
             <a:fld id="{25A13FF3-A3B4-402D-91B1-C176C247EB92}" type="datetimeFigureOut">
               <a:rPr lang="fr-CH" smtClean="0"/>
-              <a:t>03.04.2019</a:t>
+              <a:t>04.04.2019</a:t>
             </a:fld>
             <a:endParaRPr lang="fr-CH"/>
           </a:p>
@@ -2974,7 +2974,7 @@
           <a:p>
             <a:fld id="{25A13FF3-A3B4-402D-91B1-C176C247EB92}" type="datetimeFigureOut">
               <a:rPr lang="fr-CH" smtClean="0"/>
-              <a:t>03.04.2019</a:t>
+              <a:t>04.04.2019</a:t>
             </a:fld>
             <a:endParaRPr lang="fr-CH"/>
           </a:p>
@@ -6820,7 +6820,7 @@
           <a:graphicData uri="http://schemas.openxmlformats.org/presentationml/2006/ole">
             <mc:AlternateContent xmlns:mc="http://schemas.openxmlformats.org/markup-compatibility/2006">
               <mc:Choice xmlns:v="urn:schemas-microsoft-com:vml" Requires="v">
-                <p:oleObj spid="_x0000_s1030" name="think-cell Slide" r:id="rId7" imgW="353" imgH="353" progId="TCLayout.ActiveDocument.1">
+                <p:oleObj spid="_x0000_s1032" name="think-cell Slide" r:id="rId7" imgW="353" imgH="353" progId="TCLayout.ActiveDocument.1">
                   <p:embed/>
                 </p:oleObj>
               </mc:Choice>
@@ -11373,7 +11373,7 @@
           <a:graphicData uri="http://schemas.openxmlformats.org/presentationml/2006/ole">
             <mc:AlternateContent xmlns:mc="http://schemas.openxmlformats.org/markup-compatibility/2006">
               <mc:Choice xmlns:v="urn:schemas-microsoft-com:vml" Requires="v">
-                <p:oleObj spid="_x0000_s2054" name="think-cell Slide" r:id="rId5" imgW="353" imgH="353" progId="TCLayout.ActiveDocument.1">
+                <p:oleObj spid="_x0000_s2056" name="think-cell Slide" r:id="rId5" imgW="353" imgH="353" progId="TCLayout.ActiveDocument.1">
                   <p:embed/>
                 </p:oleObj>
               </mc:Choice>
@@ -14586,7 +14586,7 @@
           <a:p>
             <a:fld id="{25A13FF3-A3B4-402D-91B1-C176C247EB92}" type="datetimeFigureOut">
               <a:rPr lang="fr-CH" smtClean="0"/>
-              <a:t>03.04.2019</a:t>
+              <a:t>04.04.2019</a:t>
             </a:fld>
             <a:endParaRPr lang="fr-CH"/>
           </a:p>
@@ -16492,7 +16492,7 @@
           <a:p>
             <a:fld id="{25A13FF3-A3B4-402D-91B1-C176C247EB92}" type="datetimeFigureOut">
               <a:rPr lang="fr-CH" smtClean="0"/>
-              <a:t>03.04.2019</a:t>
+              <a:t>04.04.2019</a:t>
             </a:fld>
             <a:endParaRPr lang="fr-CH"/>
           </a:p>
@@ -18384,7 +18384,7 @@
           <a:p>
             <a:fld id="{25A13FF3-A3B4-402D-91B1-C176C247EB92}" type="datetimeFigureOut">
               <a:rPr lang="fr-CH" smtClean="0"/>
-              <a:t>03.04.2019</a:t>
+              <a:t>04.04.2019</a:t>
             </a:fld>
             <a:endParaRPr lang="fr-CH"/>
           </a:p>
@@ -20411,7 +20411,7 @@
           <a:p>
             <a:fld id="{25A13FF3-A3B4-402D-91B1-C176C247EB92}" type="datetimeFigureOut">
               <a:rPr lang="fr-CH" smtClean="0"/>
-              <a:t>03.04.2019</a:t>
+              <a:t>04.04.2019</a:t>
             </a:fld>
             <a:endParaRPr lang="fr-CH"/>
           </a:p>
@@ -22501,7 +22501,7 @@
           <a:p>
             <a:fld id="{25A13FF3-A3B4-402D-91B1-C176C247EB92}" type="datetimeFigureOut">
               <a:rPr lang="fr-CH" smtClean="0"/>
-              <a:t>03.04.2019</a:t>
+              <a:t>04.04.2019</a:t>
             </a:fld>
             <a:endParaRPr lang="fr-CH"/>
           </a:p>
@@ -24256,7 +24256,7 @@
           <a:p>
             <a:fld id="{25A13FF3-A3B4-402D-91B1-C176C247EB92}" type="datetimeFigureOut">
               <a:rPr lang="fr-CH" smtClean="0"/>
-              <a:t>03.04.2019</a:t>
+              <a:t>04.04.2019</a:t>
             </a:fld>
             <a:endParaRPr lang="fr-CH"/>
           </a:p>
@@ -26193,7 +26193,7 @@
           <a:p>
             <a:fld id="{25A13FF3-A3B4-402D-91B1-C176C247EB92}" type="datetimeFigureOut">
               <a:rPr lang="fr-CH" smtClean="0"/>
-              <a:t>03.04.2019</a:t>
+              <a:t>04.04.2019</a:t>
             </a:fld>
             <a:endParaRPr lang="fr-CH"/>
           </a:p>
@@ -28106,7 +28106,7 @@
           <a:p>
             <a:fld id="{25A13FF3-A3B4-402D-91B1-C176C247EB92}" type="datetimeFigureOut">
               <a:rPr lang="fr-CH" smtClean="0"/>
-              <a:t>03.04.2019</a:t>
+              <a:t>04.04.2019</a:t>
             </a:fld>
             <a:endParaRPr lang="fr-CH"/>
           </a:p>
@@ -29979,7 +29979,7 @@
           <a:p>
             <a:fld id="{25A13FF3-A3B4-402D-91B1-C176C247EB92}" type="datetimeFigureOut">
               <a:rPr lang="fr-CH" smtClean="0"/>
-              <a:t>03.04.2019</a:t>
+              <a:t>04.04.2019</a:t>
             </a:fld>
             <a:endParaRPr lang="fr-CH"/>
           </a:p>
@@ -30409,7 +30409,7 @@
           <a:graphicData uri="http://schemas.openxmlformats.org/presentationml/2006/ole">
             <mc:AlternateContent xmlns:mc="http://schemas.openxmlformats.org/markup-compatibility/2006">
               <mc:Choice xmlns:v="urn:schemas-microsoft-com:vml" Requires="v">
-                <p:oleObj spid="_x0000_s4103" name="think-cell Slide" r:id="rId24" imgW="353" imgH="353" progId="TCLayout.ActiveDocument.1">
+                <p:oleObj spid="_x0000_s4105" name="think-cell Slide" r:id="rId24" imgW="353" imgH="353" progId="TCLayout.ActiveDocument.1">
                   <p:embed/>
                 </p:oleObj>
               </mc:Choice>
@@ -30467,12 +30467,12 @@
           <a:lstStyle/>
           <a:p>
             <a:r>
-              <a:rPr lang="fr-CH" b="1" dirty="0">
+              <a:rPr lang="fr-CH" b="1" dirty="0" smtClean="0">
                 <a:solidFill>
                   <a:schemeClr val="accent1"/>
                 </a:solidFill>
               </a:rPr>
-              <a:t>03</a:t>
+              <a:t>01</a:t>
             </a:r>
             <a:endParaRPr lang="fr-CH" dirty="0"/>
           </a:p>
@@ -30716,7 +30716,25 @@
                 </a:solidFill>
                 <a:latin typeface="Arial Black" panose="020B0A04020102020204" pitchFamily="34" charset="0"/>
               </a:rPr>
-              <a:t>Partie</a:t>
+              <a:t>Partie 0 </a:t>
+            </a:r>
+            <a:r>
+              <a:rPr lang="fr-CH" sz="4000" dirty="0" smtClean="0">
+                <a:solidFill>
+                  <a:srgbClr val="FFC000"/>
+                </a:solidFill>
+                <a:latin typeface="Arial Black" panose="020B0A04020102020204" pitchFamily="34" charset="0"/>
+              </a:rPr>
+              <a:t>/</a:t>
+            </a:r>
+            <a:r>
+              <a:rPr lang="fr-CH" sz="4000" i="1" dirty="0" smtClean="0">
+                <a:solidFill>
+                  <a:srgbClr val="FFC000"/>
+                </a:solidFill>
+                <a:latin typeface="Arial Black" panose="020B0A04020102020204" pitchFamily="34" charset="0"/>
+              </a:rPr>
+              <a:t>8</a:t>
             </a:r>
             <a:endParaRPr lang="fr-CH" sz="4000" i="1" dirty="0">
               <a:solidFill>
@@ -30910,13 +30928,6 @@
               </a:rPr>
               <a:t>1</a:t>
             </a:r>
-            <a:endParaRPr lang="fr-CH" sz="3600" dirty="0">
-              <a:solidFill>
-                <a:schemeClr val="accent4"/>
-              </a:solidFill>
-              <a:latin typeface="Arial Black" panose="020B0A04020102020204" pitchFamily="34" charset="0"/>
-              <a:cs typeface="Arial" panose="020B0604020202020204" pitchFamily="34" charset="0"/>
-            </a:endParaRPr>
           </a:p>
         </p:txBody>
       </p:sp>
@@ -33221,7 +33232,7 @@
           <a:graphicData uri="http://schemas.openxmlformats.org/presentationml/2006/ole">
             <mc:AlternateContent xmlns:mc="http://schemas.openxmlformats.org/markup-compatibility/2006">
               <mc:Choice xmlns:v="urn:schemas-microsoft-com:vml" Requires="v">
-                <p:oleObj spid="_x0000_s5126" name="think-cell Slide" r:id="rId8" imgW="270" imgH="270" progId="TCLayout.ActiveDocument.1">
+                <p:oleObj spid="_x0000_s5128" name="think-cell Slide" r:id="rId8" imgW="270" imgH="270" progId="TCLayout.ActiveDocument.1">
                   <p:embed/>
                 </p:oleObj>
               </mc:Choice>
@@ -33256,34 +33267,6 @@
           </a:graphicData>
         </a:graphic>
       </p:graphicFrame>
-      <p:sp>
-        <p:nvSpPr>
-          <p:cNvPr id="6" name="Title 5"/>
-          <p:cNvSpPr>
-            <a:spLocks noGrp="1"/>
-          </p:cNvSpPr>
-          <p:nvPr>
-            <p:ph type="title"/>
-            <p:custDataLst>
-              <p:tags r:id="rId4"/>
-            </p:custDataLst>
-          </p:nvPr>
-        </p:nvSpPr>
-        <p:spPr bwMode="gray"/>
-        <p:txBody>
-          <a:bodyPr>
-            <a:normAutofit fontScale="90000"/>
-          </a:bodyPr>
-          <a:lstStyle/>
-          <a:p>
-            <a:r>
-              <a:rPr lang="fr-CH" dirty="0" smtClean="0"/>
-              <a:t>Titre</a:t>
-            </a:r>
-            <a:endParaRPr lang="fr-FR" dirty="0"/>
-          </a:p>
-        </p:txBody>
-      </p:sp>
       <p:sp>
         <p:nvSpPr>
           <p:cNvPr id="5" name="TextBox 4"/>
@@ -33326,7 +33309,7 @@
           </p:cNvSpPr>
           <p:nvPr>
             <p:custDataLst>
-              <p:tags r:id="rId5"/>
+              <p:tags r:id="rId4"/>
             </p:custDataLst>
           </p:nvPr>
         </p:nvSpPr>
@@ -33482,7 +33465,46 @@
       </p:sp>
       <p:sp>
         <p:nvSpPr>
-          <p:cNvPr id="26" name="ZoneTexte 25">
+          <p:cNvPr id="11" name="Title 4">
+            <a:extLst>
+              <a:ext uri="{FF2B5EF4-FFF2-40B4-BE49-F238E27FC236}">
+                <a16:creationId xmlns:a16="http://schemas.microsoft.com/office/drawing/2014/main" id="{374B7ED6-666C-4C9A-8B7A-DBBDF0ED2B59}"/>
+              </a:ext>
+            </a:extLst>
+          </p:cNvPr>
+          <p:cNvSpPr>
+            <a:spLocks noGrp="1"/>
+          </p:cNvSpPr>
+          <p:nvPr>
+            <p:ph type="title"/>
+            <p:custDataLst>
+              <p:tags r:id="rId5"/>
+            </p:custDataLst>
+          </p:nvPr>
+        </p:nvSpPr>
+        <p:spPr>
+          <a:xfrm>
+            <a:off x="623888" y="730800"/>
+            <a:ext cx="10944225" cy="325952"/>
+          </a:xfrm>
+        </p:spPr>
+        <p:txBody>
+          <a:bodyPr>
+            <a:normAutofit fontScale="90000"/>
+          </a:bodyPr>
+          <a:lstStyle/>
+          <a:p>
+            <a:r>
+              <a:rPr lang="fr-CH" dirty="0" smtClean="0"/>
+              <a:t>Sommaire</a:t>
+            </a:r>
+            <a:endParaRPr lang="en-US" dirty="0"/>
+          </a:p>
+        </p:txBody>
+      </p:sp>
+      <p:sp>
+        <p:nvSpPr>
+          <p:cNvPr id="12" name="ZoneTexte 11">
             <a:extLst>
               <a:ext uri="{FF2B5EF4-FFF2-40B4-BE49-F238E27FC236}">
                 <a16:creationId xmlns:a16="http://schemas.microsoft.com/office/drawing/2014/main" id="{E32D746F-9A2D-4398-BE1E-3699C34DCB73}"/>
@@ -33588,7 +33610,7 @@
           <a:graphicData uri="http://schemas.openxmlformats.org/presentationml/2006/ole">
             <mc:AlternateContent xmlns:mc="http://schemas.openxmlformats.org/markup-compatibility/2006">
               <mc:Choice xmlns:v="urn:schemas-microsoft-com:vml" Requires="v">
-                <p:oleObj spid="_x0000_s6150" name="think-cell Slide" r:id="rId34" imgW="270" imgH="270" progId="TCLayout.ActiveDocument.1">
+                <p:oleObj spid="_x0000_s6152" name="think-cell Slide" r:id="rId34" imgW="270" imgH="270" progId="TCLayout.ActiveDocument.1">
                   <p:embed/>
                 </p:oleObj>
               </mc:Choice>
@@ -45212,7 +45234,7 @@
           <a:graphicData uri="http://schemas.openxmlformats.org/presentationml/2006/ole">
             <mc:AlternateContent xmlns:mc="http://schemas.openxmlformats.org/markup-compatibility/2006">
               <mc:Choice xmlns:v="urn:schemas-microsoft-com:vml" Requires="v">
-                <p:oleObj spid="_x0000_s8198" name="think-cell Slide" r:id="rId14" imgW="270" imgH="270" progId="TCLayout.ActiveDocument.1">
+                <p:oleObj spid="_x0000_s8200" name="think-cell Slide" r:id="rId14" imgW="270" imgH="270" progId="TCLayout.ActiveDocument.1">
                   <p:embed/>
                 </p:oleObj>
               </mc:Choice>
@@ -50235,12 +50257,6 @@
 <file path=ppt/tags/tag41.xml><?xml version="1.0" encoding="utf-8"?>
 <p:tagLst xmlns:a="http://schemas.openxmlformats.org/drawingml/2006/main" xmlns:r="http://schemas.openxmlformats.org/officeDocument/2006/relationships" xmlns:p="http://schemas.openxmlformats.org/presentationml/2006/main">
   <p:tag name="VCTCREATESHAPEHANDLED" val="0"/>
-</p:tagLst>
-</file>
-
-<file path=ppt/tags/tag42.xml><?xml version="1.0" encoding="utf-8"?>
-<p:tagLst xmlns:a="http://schemas.openxmlformats.org/drawingml/2006/main" xmlns:r="http://schemas.openxmlformats.org/officeDocument/2006/relationships" xmlns:p="http://schemas.openxmlformats.org/presentationml/2006/main">
-  <p:tag name="VCTCREATESHAPEHANDLED" val="0"/>
   <p:tag name="MIO_GUID" val="8b8fd338-4f16-4c91-a889-94dd23b4f476"/>
   <p:tag name="MIO_EK" val="11494"/>
   <p:tag name="MIO_EKGUID" val="9e0591cd-320b-48c3-98bc-03985f91e6c6"/>
@@ -50249,6 +50265,12 @@
   <p:tag name="MIO_DBID" val="218709A9-2117-4AF1-A1EA-309C9A305E58"/>
   <p:tag name="MIO_LASTDOWNLOADED" val="17.07.2018 20:54:09"/>
   <p:tag name="MIO_OBJECTNAME" val="Freeform 115"/>
+</p:tagLst>
+</file>
+
+<file path=ppt/tags/tag42.xml><?xml version="1.0" encoding="utf-8"?>
+<p:tagLst xmlns:a="http://schemas.openxmlformats.org/drawingml/2006/main" xmlns:r="http://schemas.openxmlformats.org/officeDocument/2006/relationships" xmlns:p="http://schemas.openxmlformats.org/presentationml/2006/main">
+  <p:tag name="VCTCREATESHAPEHANDLED" val="0"/>
 </p:tagLst>
 </file>
 

</xml_diff>

<commit_message>
rendu selon la demande
</commit_message>
<xml_diff>
--- a/Dev/Présentation.pptx
+++ b/Dev/Présentation.pptx
@@ -202,7 +202,7 @@
           <a:p>
             <a:fld id="{424A98EB-6ADD-4D71-B2D7-56CE150BD037}" type="datetimeFigureOut">
               <a:rPr lang="fr-CH" smtClean="0"/>
-              <a:t>04.04.2019</a:t>
+              <a:t>05.04.2019</a:t>
             </a:fld>
             <a:endParaRPr lang="fr-CH"/>
           </a:p>
@@ -964,7 +964,7 @@
           <a:p>
             <a:fld id="{25A13FF3-A3B4-402D-91B1-C176C247EB92}" type="datetimeFigureOut">
               <a:rPr lang="fr-CH" smtClean="0"/>
-              <a:t>04.04.2019</a:t>
+              <a:t>05.04.2019</a:t>
             </a:fld>
             <a:endParaRPr lang="fr-CH"/>
           </a:p>
@@ -1134,7 +1134,7 @@
           <a:p>
             <a:fld id="{25A13FF3-A3B4-402D-91B1-C176C247EB92}" type="datetimeFigureOut">
               <a:rPr lang="fr-CH" smtClean="0"/>
-              <a:t>04.04.2019</a:t>
+              <a:t>05.04.2019</a:t>
             </a:fld>
             <a:endParaRPr lang="fr-CH"/>
           </a:p>
@@ -2974,7 +2974,7 @@
           <a:p>
             <a:fld id="{25A13FF3-A3B4-402D-91B1-C176C247EB92}" type="datetimeFigureOut">
               <a:rPr lang="fr-CH" smtClean="0"/>
-              <a:t>04.04.2019</a:t>
+              <a:t>05.04.2019</a:t>
             </a:fld>
             <a:endParaRPr lang="fr-CH"/>
           </a:p>
@@ -6820,7 +6820,7 @@
           <a:graphicData uri="http://schemas.openxmlformats.org/presentationml/2006/ole">
             <mc:AlternateContent xmlns:mc="http://schemas.openxmlformats.org/markup-compatibility/2006">
               <mc:Choice xmlns:v="urn:schemas-microsoft-com:vml" Requires="v">
-                <p:oleObj spid="_x0000_s1032" name="think-cell Slide" r:id="rId7" imgW="353" imgH="353" progId="TCLayout.ActiveDocument.1">
+                <p:oleObj spid="_x0000_s1035" name="think-cell Slide" r:id="rId7" imgW="353" imgH="353" progId="TCLayout.ActiveDocument.1">
                   <p:embed/>
                 </p:oleObj>
               </mc:Choice>
@@ -11373,7 +11373,7 @@
           <a:graphicData uri="http://schemas.openxmlformats.org/presentationml/2006/ole">
             <mc:AlternateContent xmlns:mc="http://schemas.openxmlformats.org/markup-compatibility/2006">
               <mc:Choice xmlns:v="urn:schemas-microsoft-com:vml" Requires="v">
-                <p:oleObj spid="_x0000_s2056" name="think-cell Slide" r:id="rId5" imgW="353" imgH="353" progId="TCLayout.ActiveDocument.1">
+                <p:oleObj spid="_x0000_s2059" name="think-cell Slide" r:id="rId5" imgW="353" imgH="353" progId="TCLayout.ActiveDocument.1">
                   <p:embed/>
                 </p:oleObj>
               </mc:Choice>
@@ -14586,7 +14586,7 @@
           <a:p>
             <a:fld id="{25A13FF3-A3B4-402D-91B1-C176C247EB92}" type="datetimeFigureOut">
               <a:rPr lang="fr-CH" smtClean="0"/>
-              <a:t>04.04.2019</a:t>
+              <a:t>05.04.2019</a:t>
             </a:fld>
             <a:endParaRPr lang="fr-CH"/>
           </a:p>
@@ -16492,7 +16492,7 @@
           <a:p>
             <a:fld id="{25A13FF3-A3B4-402D-91B1-C176C247EB92}" type="datetimeFigureOut">
               <a:rPr lang="fr-CH" smtClean="0"/>
-              <a:t>04.04.2019</a:t>
+              <a:t>05.04.2019</a:t>
             </a:fld>
             <a:endParaRPr lang="fr-CH"/>
           </a:p>
@@ -18384,7 +18384,7 @@
           <a:p>
             <a:fld id="{25A13FF3-A3B4-402D-91B1-C176C247EB92}" type="datetimeFigureOut">
               <a:rPr lang="fr-CH" smtClean="0"/>
-              <a:t>04.04.2019</a:t>
+              <a:t>05.04.2019</a:t>
             </a:fld>
             <a:endParaRPr lang="fr-CH"/>
           </a:p>
@@ -20411,7 +20411,7 @@
           <a:p>
             <a:fld id="{25A13FF3-A3B4-402D-91B1-C176C247EB92}" type="datetimeFigureOut">
               <a:rPr lang="fr-CH" smtClean="0"/>
-              <a:t>04.04.2019</a:t>
+              <a:t>05.04.2019</a:t>
             </a:fld>
             <a:endParaRPr lang="fr-CH"/>
           </a:p>
@@ -22501,7 +22501,7 @@
           <a:p>
             <a:fld id="{25A13FF3-A3B4-402D-91B1-C176C247EB92}" type="datetimeFigureOut">
               <a:rPr lang="fr-CH" smtClean="0"/>
-              <a:t>04.04.2019</a:t>
+              <a:t>05.04.2019</a:t>
             </a:fld>
             <a:endParaRPr lang="fr-CH"/>
           </a:p>
@@ -24256,7 +24256,7 @@
           <a:p>
             <a:fld id="{25A13FF3-A3B4-402D-91B1-C176C247EB92}" type="datetimeFigureOut">
               <a:rPr lang="fr-CH" smtClean="0"/>
-              <a:t>04.04.2019</a:t>
+              <a:t>05.04.2019</a:t>
             </a:fld>
             <a:endParaRPr lang="fr-CH"/>
           </a:p>
@@ -26193,7 +26193,7 @@
           <a:p>
             <a:fld id="{25A13FF3-A3B4-402D-91B1-C176C247EB92}" type="datetimeFigureOut">
               <a:rPr lang="fr-CH" smtClean="0"/>
-              <a:t>04.04.2019</a:t>
+              <a:t>05.04.2019</a:t>
             </a:fld>
             <a:endParaRPr lang="fr-CH"/>
           </a:p>
@@ -28106,7 +28106,7 @@
           <a:p>
             <a:fld id="{25A13FF3-A3B4-402D-91B1-C176C247EB92}" type="datetimeFigureOut">
               <a:rPr lang="fr-CH" smtClean="0"/>
-              <a:t>04.04.2019</a:t>
+              <a:t>05.04.2019</a:t>
             </a:fld>
             <a:endParaRPr lang="fr-CH"/>
           </a:p>
@@ -29979,7 +29979,7 @@
           <a:p>
             <a:fld id="{25A13FF3-A3B4-402D-91B1-C176C247EB92}" type="datetimeFigureOut">
               <a:rPr lang="fr-CH" smtClean="0"/>
-              <a:t>04.04.2019</a:t>
+              <a:t>05.04.2019</a:t>
             </a:fld>
             <a:endParaRPr lang="fr-CH"/>
           </a:p>
@@ -30409,7 +30409,7 @@
           <a:graphicData uri="http://schemas.openxmlformats.org/presentationml/2006/ole">
             <mc:AlternateContent xmlns:mc="http://schemas.openxmlformats.org/markup-compatibility/2006">
               <mc:Choice xmlns:v="urn:schemas-microsoft-com:vml" Requires="v">
-                <p:oleObj spid="_x0000_s4105" name="think-cell Slide" r:id="rId24" imgW="353" imgH="353" progId="TCLayout.ActiveDocument.1">
+                <p:oleObj spid="_x0000_s4108" name="think-cell Slide" r:id="rId24" imgW="353" imgH="353" progId="TCLayout.ActiveDocument.1">
                   <p:embed/>
                 </p:oleObj>
               </mc:Choice>
@@ -33232,7 +33232,7 @@
           <a:graphicData uri="http://schemas.openxmlformats.org/presentationml/2006/ole">
             <mc:AlternateContent xmlns:mc="http://schemas.openxmlformats.org/markup-compatibility/2006">
               <mc:Choice xmlns:v="urn:schemas-microsoft-com:vml" Requires="v">
-                <p:oleObj spid="_x0000_s5128" name="think-cell Slide" r:id="rId8" imgW="270" imgH="270" progId="TCLayout.ActiveDocument.1">
+                <p:oleObj spid="_x0000_s5131" name="think-cell Slide" r:id="rId8" imgW="270" imgH="270" progId="TCLayout.ActiveDocument.1">
                   <p:embed/>
                 </p:oleObj>
               </mc:Choice>
@@ -33610,7 +33610,7 @@
           <a:graphicData uri="http://schemas.openxmlformats.org/presentationml/2006/ole">
             <mc:AlternateContent xmlns:mc="http://schemas.openxmlformats.org/markup-compatibility/2006">
               <mc:Choice xmlns:v="urn:schemas-microsoft-com:vml" Requires="v">
-                <p:oleObj spid="_x0000_s6152" name="think-cell Slide" r:id="rId34" imgW="270" imgH="270" progId="TCLayout.ActiveDocument.1">
+                <p:oleObj spid="_x0000_s6155" name="think-cell Slide" r:id="rId34" imgW="270" imgH="270" progId="TCLayout.ActiveDocument.1">
                   <p:embed/>
                 </p:oleObj>
               </mc:Choice>
@@ -45234,7 +45234,7 @@
           <a:graphicData uri="http://schemas.openxmlformats.org/presentationml/2006/ole">
             <mc:AlternateContent xmlns:mc="http://schemas.openxmlformats.org/markup-compatibility/2006">
               <mc:Choice xmlns:v="urn:schemas-microsoft-com:vml" Requires="v">
-                <p:oleObj spid="_x0000_s8200" name="think-cell Slide" r:id="rId14" imgW="270" imgH="270" progId="TCLayout.ActiveDocument.1">
+                <p:oleObj spid="_x0000_s8203" name="think-cell Slide" r:id="rId14" imgW="270" imgH="270" progId="TCLayout.ActiveDocument.1">
                   <p:embed/>
                 </p:oleObj>
               </mc:Choice>

</xml_diff>